<commit_message>
services types & pricing
</commit_message>
<xml_diff>
--- a/AMAZON WEB SERVICE.pptx
+++ b/AMAZON WEB SERVICE.pptx
@@ -5,7 +5,7 @@
     <p:sldMasterId id="2147483660" r:id="rId1"/>
   </p:sldMasterIdLst>
   <p:notesMasterIdLst>
-    <p:notesMasterId r:id="rId10"/>
+    <p:notesMasterId r:id="rId12"/>
   </p:notesMasterIdLst>
   <p:sldIdLst>
     <p:sldId id="256" r:id="rId2"/>
@@ -16,6 +16,8 @@
     <p:sldId id="261" r:id="rId7"/>
     <p:sldId id="262" r:id="rId8"/>
     <p:sldId id="263" r:id="rId9"/>
+    <p:sldId id="264" r:id="rId10"/>
+    <p:sldId id="265" r:id="rId11"/>
   </p:sldIdLst>
   <p:sldSz cx="12192000" cy="6858000"/>
   <p:notesSz cx="6858000" cy="9144000"/>
@@ -114,6 +116,11 @@
       </a:defRPr>
     </a:lvl9pPr>
   </p:defaultTextStyle>
+  <p:extLst>
+    <p:ext uri="{EFAFB233-063F-42B5-8137-9DF3F51BA10A}">
+      <p15:sldGuideLst xmlns:p15="http://schemas.microsoft.com/office/powerpoint/2012/main"/>
+    </p:ext>
+  </p:extLst>
 </p:presentation>
 </file>
 
@@ -239,7 +246,7 @@
           <a:p>
             <a:fld id="{851B09C4-FE31-4A85-883C-08A60B227451}" type="datetimeFigureOut">
               <a:rPr lang="en-US" smtClean="0"/>
-              <a:t>6/24/2022</a:t>
+              <a:t>6/25/2022</a:t>
             </a:fld>
             <a:endParaRPr lang="en-US"/>
           </a:p>
@@ -1271,7 +1278,7 @@
           <a:p>
             <a:fld id="{C0594C2A-21FD-4EBC-BACA-F39ED0F18CE6}" type="datetime1">
               <a:rPr lang="en-US" smtClean="0"/>
-              <a:t>6/24/2022</a:t>
+              <a:t>6/25/2022</a:t>
             </a:fld>
             <a:endParaRPr lang="en-US"/>
           </a:p>
@@ -1453,7 +1460,7 @@
           <a:p>
             <a:fld id="{6D8C24D6-FB1B-4192-9701-026AA46CA7C6}" type="datetime1">
               <a:rPr lang="en-US" smtClean="0"/>
-              <a:t>6/24/2022</a:t>
+              <a:t>6/25/2022</a:t>
             </a:fld>
             <a:endParaRPr lang="en-US"/>
           </a:p>
@@ -1636,7 +1643,7 @@
           <a:p>
             <a:fld id="{8C964018-ACC5-4E3B-B046-4D8E9512A9D2}" type="datetime1">
               <a:rPr lang="en-US" smtClean="0"/>
-              <a:t>6/24/2022</a:t>
+              <a:t>6/25/2022</a:t>
             </a:fld>
             <a:endParaRPr lang="en-US"/>
           </a:p>
@@ -1809,7 +1816,7 @@
           <a:p>
             <a:fld id="{5B79A491-C74C-42C6-9F80-146A0916E44B}" type="datetime1">
               <a:rPr lang="en-US" smtClean="0"/>
-              <a:t>6/24/2022</a:t>
+              <a:t>6/25/2022</a:t>
             </a:fld>
             <a:endParaRPr lang="en-US"/>
           </a:p>
@@ -2125,7 +2132,7 @@
           <a:p>
             <a:fld id="{533E66AD-54EB-485F-99B0-20AF25564B99}" type="datetime1">
               <a:rPr lang="en-US" smtClean="0"/>
-              <a:t>6/24/2022</a:t>
+              <a:t>6/25/2022</a:t>
             </a:fld>
             <a:endParaRPr lang="en-US"/>
           </a:p>
@@ -2514,7 +2521,7 @@
           <a:p>
             <a:fld id="{C6AB220F-B426-45DF-9C1C-1FCACD1DE5A8}" type="datetime1">
               <a:rPr lang="en-US" smtClean="0"/>
-              <a:t>6/24/2022</a:t>
+              <a:t>6/25/2022</a:t>
             </a:fld>
             <a:endParaRPr lang="en-US"/>
           </a:p>
@@ -2951,7 +2958,7 @@
           <a:p>
             <a:fld id="{1BF41ECF-ADE9-4F3F-93C2-508996723BD9}" type="datetime1">
               <a:rPr lang="en-US" smtClean="0"/>
-              <a:t>6/24/2022</a:t>
+              <a:t>6/25/2022</a:t>
             </a:fld>
             <a:endParaRPr lang="en-US"/>
           </a:p>
@@ -3072,7 +3079,7 @@
           <a:p>
             <a:fld id="{D401C7ED-A4BF-4732-8C97-8BD8AC46CE85}" type="datetime1">
               <a:rPr lang="en-US" smtClean="0"/>
-              <a:t>6/24/2022</a:t>
+              <a:t>6/25/2022</a:t>
             </a:fld>
             <a:endParaRPr lang="en-US"/>
           </a:p>
@@ -3170,7 +3177,7 @@
           <a:p>
             <a:fld id="{B49C5932-0356-41F7-94A3-3677F8A38B09}" type="datetime1">
               <a:rPr lang="en-US" smtClean="0"/>
-              <a:t>6/24/2022</a:t>
+              <a:t>6/25/2022</a:t>
             </a:fld>
             <a:endParaRPr lang="en-US"/>
           </a:p>
@@ -3523,7 +3530,7 @@
           <a:p>
             <a:fld id="{645AA652-9D79-4F55-B0C8-379F140E2D76}" type="datetime1">
               <a:rPr lang="en-US" smtClean="0"/>
-              <a:t>6/24/2022</a:t>
+              <a:t>6/25/2022</a:t>
             </a:fld>
             <a:endParaRPr lang="en-US"/>
           </a:p>
@@ -3951,7 +3958,7 @@
           <a:p>
             <a:fld id="{AE135DFB-A936-4C51-915B-C8A26E5A0EDE}" type="datetime1">
               <a:rPr lang="en-US" smtClean="0"/>
-              <a:t>6/24/2022</a:t>
+              <a:t>6/25/2022</a:t>
             </a:fld>
             <a:endParaRPr lang="en-US"/>
           </a:p>
@@ -4232,7 +4239,7 @@
           <a:p>
             <a:fld id="{92D97A9B-530C-4E40-961F-802ACCD46B2D}" type="datetime1">
               <a:rPr lang="en-US" smtClean="0"/>
-              <a:t>6/24/2022</a:t>
+              <a:t>6/25/2022</a:t>
             </a:fld>
             <a:endParaRPr lang="en-US"/>
           </a:p>
@@ -4943,6 +4950,214 @@
 </p:sld>
 </file>
 
+<file path=ppt/slides/slide10.xml><?xml version="1.0" encoding="utf-8"?>
+<p:sld xmlns:a="http://schemas.openxmlformats.org/drawingml/2006/main" xmlns:r="http://schemas.openxmlformats.org/officeDocument/2006/relationships" xmlns:p="http://schemas.openxmlformats.org/presentationml/2006/main">
+  <p:cSld>
+    <p:spTree>
+      <p:nvGrpSpPr>
+        <p:cNvPr id="1" name=""/>
+        <p:cNvGrpSpPr/>
+        <p:nvPr/>
+      </p:nvGrpSpPr>
+      <p:grpSpPr>
+        <a:xfrm>
+          <a:off x="0" y="0"/>
+          <a:ext cx="0" cy="0"/>
+          <a:chOff x="0" y="0"/>
+          <a:chExt cx="0" cy="0"/>
+        </a:xfrm>
+      </p:grpSpPr>
+      <p:sp>
+        <p:nvSpPr>
+          <p:cNvPr id="2" name="Title 1">
+            <a:extLst>
+              <a:ext uri="{FF2B5EF4-FFF2-40B4-BE49-F238E27FC236}">
+                <a16:creationId xmlns:a16="http://schemas.microsoft.com/office/drawing/2014/main" id="{0E2163E1-8088-3F9D-3959-7A009D5D2F42}"/>
+              </a:ext>
+            </a:extLst>
+          </p:cNvPr>
+          <p:cNvSpPr>
+            <a:spLocks noGrp="1"/>
+          </p:cNvSpPr>
+          <p:nvPr>
+            <p:ph type="title"/>
+          </p:nvPr>
+        </p:nvSpPr>
+        <p:spPr/>
+        <p:txBody>
+          <a:bodyPr/>
+          <a:lstStyle/>
+          <a:p>
+            <a:r>
+              <a:rPr lang="en-US" dirty="0"/>
+              <a:t>pricing</a:t>
+            </a:r>
+          </a:p>
+        </p:txBody>
+      </p:sp>
+      <p:sp>
+        <p:nvSpPr>
+          <p:cNvPr id="3" name="Content Placeholder 2">
+            <a:extLst>
+              <a:ext uri="{FF2B5EF4-FFF2-40B4-BE49-F238E27FC236}">
+                <a16:creationId xmlns:a16="http://schemas.microsoft.com/office/drawing/2014/main" id="{EDCCA9F0-DF85-3DAF-EEDF-DFB70A98D926}"/>
+              </a:ext>
+            </a:extLst>
+          </p:cNvPr>
+          <p:cNvSpPr>
+            <a:spLocks noGrp="1"/>
+          </p:cNvSpPr>
+          <p:nvPr>
+            <p:ph idx="1"/>
+          </p:nvPr>
+        </p:nvSpPr>
+        <p:spPr/>
+        <p:txBody>
+          <a:bodyPr>
+            <a:normAutofit fontScale="92500" lnSpcReduction="20000"/>
+          </a:bodyPr>
+          <a:lstStyle/>
+          <a:p>
+            <a:pPr algn="just">
+              <a:lnSpc>
+                <a:spcPct val="200000"/>
+              </a:lnSpc>
+            </a:pPr>
+            <a:r>
+              <a:rPr lang="en-US" b="1" u="sng" dirty="0"/>
+              <a:t>Computation: </a:t>
+            </a:r>
+          </a:p>
+          <a:p>
+            <a:pPr marL="0" indent="0" algn="just">
+              <a:lnSpc>
+                <a:spcPct val="200000"/>
+              </a:lnSpc>
+              <a:buNone/>
+            </a:pPr>
+            <a:r>
+              <a:rPr lang="en-US" dirty="0"/>
+              <a:t>	Pay only for the total times that we’ve used for computation process.</a:t>
+            </a:r>
+          </a:p>
+          <a:p>
+            <a:pPr algn="just">
+              <a:lnSpc>
+                <a:spcPct val="200000"/>
+              </a:lnSpc>
+            </a:pPr>
+            <a:r>
+              <a:rPr lang="en-US" b="1" u="sng" dirty="0"/>
+              <a:t>Storage:</a:t>
+            </a:r>
+          </a:p>
+          <a:p>
+            <a:pPr marL="0" indent="0" algn="just">
+              <a:lnSpc>
+                <a:spcPct val="200000"/>
+              </a:lnSpc>
+              <a:buNone/>
+            </a:pPr>
+            <a:r>
+              <a:rPr lang="en-US" dirty="0"/>
+              <a:t>	Pay only for the exact amount of data we’ve stored</a:t>
+            </a:r>
+          </a:p>
+          <a:p>
+            <a:pPr algn="just">
+              <a:lnSpc>
+                <a:spcPct val="200000"/>
+              </a:lnSpc>
+            </a:pPr>
+            <a:r>
+              <a:rPr lang="en-US" b="1" u="sng" dirty="0"/>
+              <a:t>Networking:</a:t>
+            </a:r>
+          </a:p>
+          <a:p>
+            <a:pPr marL="0" indent="0" algn="just">
+              <a:lnSpc>
+                <a:spcPct val="200000"/>
+              </a:lnSpc>
+              <a:buNone/>
+            </a:pPr>
+            <a:r>
+              <a:rPr lang="en-US" dirty="0"/>
+              <a:t>	Pay for only for data that leaves the cloud. Any data going into the cloud is free.</a:t>
+            </a:r>
+          </a:p>
+        </p:txBody>
+      </p:sp>
+      <p:sp>
+        <p:nvSpPr>
+          <p:cNvPr id="4" name="Footer Placeholder 3">
+            <a:extLst>
+              <a:ext uri="{FF2B5EF4-FFF2-40B4-BE49-F238E27FC236}">
+                <a16:creationId xmlns:a16="http://schemas.microsoft.com/office/drawing/2014/main" id="{277D3174-A069-E6FE-A708-7311F45E5998}"/>
+              </a:ext>
+            </a:extLst>
+          </p:cNvPr>
+          <p:cNvSpPr>
+            <a:spLocks noGrp="1"/>
+          </p:cNvSpPr>
+          <p:nvPr>
+            <p:ph type="ftr" sz="quarter" idx="11"/>
+          </p:nvPr>
+        </p:nvSpPr>
+        <p:spPr/>
+        <p:txBody>
+          <a:bodyPr/>
+          <a:lstStyle/>
+          <a:p>
+            <a:r>
+              <a:rPr lang="en-US"/>
+              <a:t>S. M. Abrar Shahriar</a:t>
+            </a:r>
+          </a:p>
+        </p:txBody>
+      </p:sp>
+      <p:sp>
+        <p:nvSpPr>
+          <p:cNvPr id="5" name="Slide Number Placeholder 4">
+            <a:extLst>
+              <a:ext uri="{FF2B5EF4-FFF2-40B4-BE49-F238E27FC236}">
+                <a16:creationId xmlns:a16="http://schemas.microsoft.com/office/drawing/2014/main" id="{9FA3FD4A-3AB6-AE27-E14C-A6D2ECC0795C}"/>
+              </a:ext>
+            </a:extLst>
+          </p:cNvPr>
+          <p:cNvSpPr>
+            <a:spLocks noGrp="1"/>
+          </p:cNvSpPr>
+          <p:nvPr>
+            <p:ph type="sldNum" sz="quarter" idx="12"/>
+          </p:nvPr>
+        </p:nvSpPr>
+        <p:spPr/>
+        <p:txBody>
+          <a:bodyPr/>
+          <a:lstStyle/>
+          <a:p>
+            <a:fld id="{74F1BC65-A0BD-46C1-8E18-CDBEDB4305F9}" type="slidenum">
+              <a:rPr lang="en-US" smtClean="0"/>
+              <a:t>10</a:t>
+            </a:fld>
+            <a:endParaRPr lang="en-US"/>
+          </a:p>
+        </p:txBody>
+      </p:sp>
+    </p:spTree>
+    <p:extLst>
+      <p:ext uri="{BB962C8B-B14F-4D97-AF65-F5344CB8AC3E}">
+        <p14:creationId xmlns:p14="http://schemas.microsoft.com/office/powerpoint/2010/main" val="836810173"/>
+      </p:ext>
+    </p:extLst>
+  </p:cSld>
+  <p:clrMapOvr>
+    <a:masterClrMapping/>
+  </p:clrMapOvr>
+</p:sld>
+</file>
+
 <file path=ppt/slides/slide2.xml><?xml version="1.0" encoding="utf-8"?>
 <p:sld xmlns:a="http://schemas.openxmlformats.org/drawingml/2006/main" xmlns:r="http://schemas.openxmlformats.org/officeDocument/2006/relationships" xmlns:p="http://schemas.openxmlformats.org/presentationml/2006/main">
   <p:cSld>
@@ -7521,6 +7736,245 @@
     <p:extLst>
       <p:ext uri="{BB962C8B-B14F-4D97-AF65-F5344CB8AC3E}">
         <p14:creationId xmlns:p14="http://schemas.microsoft.com/office/powerpoint/2010/main" val="1256668693"/>
+      </p:ext>
+    </p:extLst>
+  </p:cSld>
+  <p:clrMapOvr>
+    <a:masterClrMapping/>
+  </p:clrMapOvr>
+</p:sld>
+</file>
+
+<file path=ppt/slides/slide9.xml><?xml version="1.0" encoding="utf-8"?>
+<p:sld xmlns:a="http://schemas.openxmlformats.org/drawingml/2006/main" xmlns:r="http://schemas.openxmlformats.org/officeDocument/2006/relationships" xmlns:p="http://schemas.openxmlformats.org/presentationml/2006/main">
+  <p:cSld>
+    <p:spTree>
+      <p:nvGrpSpPr>
+        <p:cNvPr id="1" name=""/>
+        <p:cNvGrpSpPr/>
+        <p:nvPr/>
+      </p:nvGrpSpPr>
+      <p:grpSpPr>
+        <a:xfrm>
+          <a:off x="0" y="0"/>
+          <a:ext cx="0" cy="0"/>
+          <a:chOff x="0" y="0"/>
+          <a:chExt cx="0" cy="0"/>
+        </a:xfrm>
+      </p:grpSpPr>
+      <p:sp>
+        <p:nvSpPr>
+          <p:cNvPr id="2" name="Title 1">
+            <a:extLst>
+              <a:ext uri="{FF2B5EF4-FFF2-40B4-BE49-F238E27FC236}">
+                <a16:creationId xmlns:a16="http://schemas.microsoft.com/office/drawing/2014/main" id="{2FFE2187-3E5B-85DD-1C6E-E701C8C386E3}"/>
+              </a:ext>
+            </a:extLst>
+          </p:cNvPr>
+          <p:cNvSpPr>
+            <a:spLocks noGrp="1"/>
+          </p:cNvSpPr>
+          <p:nvPr>
+            <p:ph type="title"/>
+          </p:nvPr>
+        </p:nvSpPr>
+        <p:spPr/>
+        <p:txBody>
+          <a:bodyPr/>
+          <a:lstStyle/>
+          <a:p>
+            <a:r>
+              <a:rPr lang="en-US" dirty="0"/>
+              <a:t>cloud service types</a:t>
+            </a:r>
+          </a:p>
+        </p:txBody>
+      </p:sp>
+      <p:pic>
+        <p:nvPicPr>
+          <p:cNvPr id="7" name="Content Placeholder 6">
+            <a:extLst>
+              <a:ext uri="{FF2B5EF4-FFF2-40B4-BE49-F238E27FC236}">
+                <a16:creationId xmlns:a16="http://schemas.microsoft.com/office/drawing/2014/main" id="{3D8E87BC-F10A-58EA-4ACC-D0E2B80BDCB6}"/>
+              </a:ext>
+            </a:extLst>
+          </p:cNvPr>
+          <p:cNvPicPr>
+            <a:picLocks noGrp="1" noChangeAspect="1"/>
+          </p:cNvPicPr>
+          <p:nvPr>
+            <p:ph idx="1"/>
+          </p:nvPr>
+        </p:nvPicPr>
+        <p:blipFill>
+          <a:blip r:embed="rId2">
+            <a:extLst>
+              <a:ext uri="{BEBA8EAE-BF5A-486C-A8C5-ECC9F3942E4B}">
+                <a14:imgProps xmlns:a14="http://schemas.microsoft.com/office/drawing/2010/main">
+                  <a14:imgLayer r:embed="rId3">
+                    <a14:imgEffect>
+                      <a14:sharpenSoften amount="50000"/>
+                    </a14:imgEffect>
+                    <a14:imgEffect>
+                      <a14:saturation sat="400000"/>
+                    </a14:imgEffect>
+                  </a14:imgLayer>
+                </a14:imgProps>
+              </a:ext>
+            </a:extLst>
+          </a:blip>
+          <a:stretch>
+            <a:fillRect/>
+          </a:stretch>
+        </p:blipFill>
+        <p:spPr>
+          <a:xfrm>
+            <a:off x="982628" y="2212873"/>
+            <a:ext cx="5891072" cy="3372478"/>
+          </a:xfrm>
+          <a:prstGeom prst="rect">
+            <a:avLst/>
+          </a:prstGeom>
+          <a:ln w="38100" cap="sq">
+            <a:solidFill>
+              <a:srgbClr val="000000"/>
+            </a:solidFill>
+            <a:prstDash val="solid"/>
+            <a:miter lim="800000"/>
+          </a:ln>
+          <a:effectLst>
+            <a:outerShdw blurRad="50800" dist="38100" dir="2700000" algn="tl" rotWithShape="0">
+              <a:srgbClr val="000000">
+                <a:alpha val="43000"/>
+              </a:srgbClr>
+            </a:outerShdw>
+          </a:effectLst>
+        </p:spPr>
+      </p:pic>
+      <p:sp>
+        <p:nvSpPr>
+          <p:cNvPr id="4" name="Footer Placeholder 3">
+            <a:extLst>
+              <a:ext uri="{FF2B5EF4-FFF2-40B4-BE49-F238E27FC236}">
+                <a16:creationId xmlns:a16="http://schemas.microsoft.com/office/drawing/2014/main" id="{A899E176-4D21-F60F-EFD8-B132564BC445}"/>
+              </a:ext>
+            </a:extLst>
+          </p:cNvPr>
+          <p:cNvSpPr>
+            <a:spLocks noGrp="1"/>
+          </p:cNvSpPr>
+          <p:nvPr>
+            <p:ph type="ftr" sz="quarter" idx="11"/>
+          </p:nvPr>
+        </p:nvSpPr>
+        <p:spPr/>
+        <p:txBody>
+          <a:bodyPr/>
+          <a:lstStyle/>
+          <a:p>
+            <a:r>
+              <a:rPr lang="en-US"/>
+              <a:t>S. M. Abrar Shahriar</a:t>
+            </a:r>
+          </a:p>
+        </p:txBody>
+      </p:sp>
+      <p:sp>
+        <p:nvSpPr>
+          <p:cNvPr id="5" name="Slide Number Placeholder 4">
+            <a:extLst>
+              <a:ext uri="{FF2B5EF4-FFF2-40B4-BE49-F238E27FC236}">
+                <a16:creationId xmlns:a16="http://schemas.microsoft.com/office/drawing/2014/main" id="{30C16742-8CA5-73CA-7675-4C9923807750}"/>
+              </a:ext>
+            </a:extLst>
+          </p:cNvPr>
+          <p:cNvSpPr>
+            <a:spLocks noGrp="1"/>
+          </p:cNvSpPr>
+          <p:nvPr>
+            <p:ph type="sldNum" sz="quarter" idx="12"/>
+          </p:nvPr>
+        </p:nvSpPr>
+        <p:spPr/>
+        <p:txBody>
+          <a:bodyPr/>
+          <a:lstStyle/>
+          <a:p>
+            <a:fld id="{74F1BC65-A0BD-46C1-8E18-CDBEDB4305F9}" type="slidenum">
+              <a:rPr lang="en-US" smtClean="0"/>
+              <a:t>9</a:t>
+            </a:fld>
+            <a:endParaRPr lang="en-US"/>
+          </a:p>
+        </p:txBody>
+      </p:sp>
+      <p:pic>
+        <p:nvPicPr>
+          <p:cNvPr id="9" name="Picture 8">
+            <a:extLst>
+              <a:ext uri="{FF2B5EF4-FFF2-40B4-BE49-F238E27FC236}">
+                <a16:creationId xmlns:a16="http://schemas.microsoft.com/office/drawing/2014/main" id="{FCD5B865-CF61-CC4C-9412-FBAF650663CA}"/>
+              </a:ext>
+            </a:extLst>
+          </p:cNvPr>
+          <p:cNvPicPr>
+            <a:picLocks noChangeAspect="1"/>
+          </p:cNvPicPr>
+          <p:nvPr/>
+        </p:nvPicPr>
+        <p:blipFill>
+          <a:blip r:embed="rId4">
+            <a:duotone>
+              <a:prstClr val="black"/>
+              <a:srgbClr val="FFFF00">
+                <a:tint val="45000"/>
+                <a:satMod val="400000"/>
+              </a:srgbClr>
+            </a:duotone>
+            <a:extLst>
+              <a:ext uri="{BEBA8EAE-BF5A-486C-A8C5-ECC9F3942E4B}">
+                <a14:imgProps xmlns:a14="http://schemas.microsoft.com/office/drawing/2010/main">
+                  <a14:imgLayer r:embed="rId5">
+                    <a14:imgEffect>
+                      <a14:sharpenSoften amount="50000"/>
+                    </a14:imgEffect>
+                  </a14:imgLayer>
+                </a14:imgProps>
+              </a:ext>
+            </a:extLst>
+          </a:blip>
+          <a:stretch>
+            <a:fillRect/>
+          </a:stretch>
+        </p:blipFill>
+        <p:spPr>
+          <a:xfrm>
+            <a:off x="7075353" y="2854435"/>
+            <a:ext cx="4799917" cy="2218726"/>
+          </a:xfrm>
+          <a:prstGeom prst="rect">
+            <a:avLst/>
+          </a:prstGeom>
+          <a:ln w="38100" cap="sq">
+            <a:solidFill>
+              <a:srgbClr val="000000"/>
+            </a:solidFill>
+            <a:prstDash val="solid"/>
+            <a:miter lim="800000"/>
+          </a:ln>
+          <a:effectLst>
+            <a:outerShdw blurRad="50800" dist="38100" dir="2700000" algn="tl" rotWithShape="0">
+              <a:srgbClr val="000000">
+                <a:alpha val="43000"/>
+              </a:srgbClr>
+            </a:outerShdw>
+          </a:effectLst>
+        </p:spPr>
+      </p:pic>
+    </p:spTree>
+    <p:extLst>
+      <p:ext uri="{BB962C8B-B14F-4D97-AF65-F5344CB8AC3E}">
+        <p14:creationId xmlns:p14="http://schemas.microsoft.com/office/powerpoint/2010/main" val="1922362858"/>
       </p:ext>
     </p:extLst>
   </p:cSld>

</xml_diff>

<commit_message>
Added some contentnts on IAM user & groups
</commit_message>
<xml_diff>
--- a/AMAZON WEB SERVICE.pptx
+++ b/AMAZON WEB SERVICE.pptx
@@ -5,7 +5,7 @@
     <p:sldMasterId id="2147483660" r:id="rId1"/>
   </p:sldMasterIdLst>
   <p:notesMasterIdLst>
-    <p:notesMasterId r:id="rId12"/>
+    <p:notesMasterId r:id="rId15"/>
   </p:notesMasterIdLst>
   <p:sldIdLst>
     <p:sldId id="256" r:id="rId2"/>
@@ -18,6 +18,9 @@
     <p:sldId id="263" r:id="rId9"/>
     <p:sldId id="264" r:id="rId10"/>
     <p:sldId id="265" r:id="rId11"/>
+    <p:sldId id="266" r:id="rId12"/>
+    <p:sldId id="267" r:id="rId13"/>
+    <p:sldId id="268" r:id="rId14"/>
   </p:sldIdLst>
   <p:sldSz cx="12192000" cy="6858000"/>
   <p:notesSz cx="6858000" cy="9144000"/>
@@ -246,7 +249,7 @@
           <a:p>
             <a:fld id="{851B09C4-FE31-4A85-883C-08A60B227451}" type="datetimeFigureOut">
               <a:rPr lang="en-US" smtClean="0"/>
-              <a:t>6/25/2022</a:t>
+              <a:t>6/27/2022</a:t>
             </a:fld>
             <a:endParaRPr lang="en-US"/>
           </a:p>
@@ -1278,7 +1281,7 @@
           <a:p>
             <a:fld id="{C0594C2A-21FD-4EBC-BACA-F39ED0F18CE6}" type="datetime1">
               <a:rPr lang="en-US" smtClean="0"/>
-              <a:t>6/25/2022</a:t>
+              <a:t>6/27/2022</a:t>
             </a:fld>
             <a:endParaRPr lang="en-US"/>
           </a:p>
@@ -1460,7 +1463,7 @@
           <a:p>
             <a:fld id="{6D8C24D6-FB1B-4192-9701-026AA46CA7C6}" type="datetime1">
               <a:rPr lang="en-US" smtClean="0"/>
-              <a:t>6/25/2022</a:t>
+              <a:t>6/27/2022</a:t>
             </a:fld>
             <a:endParaRPr lang="en-US"/>
           </a:p>
@@ -1643,7 +1646,7 @@
           <a:p>
             <a:fld id="{8C964018-ACC5-4E3B-B046-4D8E9512A9D2}" type="datetime1">
               <a:rPr lang="en-US" smtClean="0"/>
-              <a:t>6/25/2022</a:t>
+              <a:t>6/27/2022</a:t>
             </a:fld>
             <a:endParaRPr lang="en-US"/>
           </a:p>
@@ -1816,7 +1819,7 @@
           <a:p>
             <a:fld id="{5B79A491-C74C-42C6-9F80-146A0916E44B}" type="datetime1">
               <a:rPr lang="en-US" smtClean="0"/>
-              <a:t>6/25/2022</a:t>
+              <a:t>6/27/2022</a:t>
             </a:fld>
             <a:endParaRPr lang="en-US"/>
           </a:p>
@@ -2132,7 +2135,7 @@
           <a:p>
             <a:fld id="{533E66AD-54EB-485F-99B0-20AF25564B99}" type="datetime1">
               <a:rPr lang="en-US" smtClean="0"/>
-              <a:t>6/25/2022</a:t>
+              <a:t>6/27/2022</a:t>
             </a:fld>
             <a:endParaRPr lang="en-US"/>
           </a:p>
@@ -2521,7 +2524,7 @@
           <a:p>
             <a:fld id="{C6AB220F-B426-45DF-9C1C-1FCACD1DE5A8}" type="datetime1">
               <a:rPr lang="en-US" smtClean="0"/>
-              <a:t>6/25/2022</a:t>
+              <a:t>6/27/2022</a:t>
             </a:fld>
             <a:endParaRPr lang="en-US"/>
           </a:p>
@@ -2958,7 +2961,7 @@
           <a:p>
             <a:fld id="{1BF41ECF-ADE9-4F3F-93C2-508996723BD9}" type="datetime1">
               <a:rPr lang="en-US" smtClean="0"/>
-              <a:t>6/25/2022</a:t>
+              <a:t>6/27/2022</a:t>
             </a:fld>
             <a:endParaRPr lang="en-US"/>
           </a:p>
@@ -3079,7 +3082,7 @@
           <a:p>
             <a:fld id="{D401C7ED-A4BF-4732-8C97-8BD8AC46CE85}" type="datetime1">
               <a:rPr lang="en-US" smtClean="0"/>
-              <a:t>6/25/2022</a:t>
+              <a:t>6/27/2022</a:t>
             </a:fld>
             <a:endParaRPr lang="en-US"/>
           </a:p>
@@ -3177,7 +3180,7 @@
           <a:p>
             <a:fld id="{B49C5932-0356-41F7-94A3-3677F8A38B09}" type="datetime1">
               <a:rPr lang="en-US" smtClean="0"/>
-              <a:t>6/25/2022</a:t>
+              <a:t>6/27/2022</a:t>
             </a:fld>
             <a:endParaRPr lang="en-US"/>
           </a:p>
@@ -3530,7 +3533,7 @@
           <a:p>
             <a:fld id="{645AA652-9D79-4F55-B0C8-379F140E2D76}" type="datetime1">
               <a:rPr lang="en-US" smtClean="0"/>
-              <a:t>6/25/2022</a:t>
+              <a:t>6/27/2022</a:t>
             </a:fld>
             <a:endParaRPr lang="en-US"/>
           </a:p>
@@ -3958,7 +3961,7 @@
           <a:p>
             <a:fld id="{AE135DFB-A936-4C51-915B-C8A26E5A0EDE}" type="datetime1">
               <a:rPr lang="en-US" smtClean="0"/>
-              <a:t>6/25/2022</a:t>
+              <a:t>6/27/2022</a:t>
             </a:fld>
             <a:endParaRPr lang="en-US"/>
           </a:p>
@@ -4239,7 +4242,7 @@
           <a:p>
             <a:fld id="{92D97A9B-530C-4E40-961F-802ACCD46B2D}" type="datetime1">
               <a:rPr lang="en-US" smtClean="0"/>
-              <a:t>6/25/2022</a:t>
+              <a:t>6/27/2022</a:t>
             </a:fld>
             <a:endParaRPr lang="en-US"/>
           </a:p>
@@ -5037,7 +5040,15 @@
             </a:pPr>
             <a:r>
               <a:rPr lang="en-US" dirty="0"/>
-              <a:t>	Pay only for the total times that we’ve used for computation process.</a:t>
+              <a:t>	Pay only for the total times </a:t>
+            </a:r>
+            <a:r>
+              <a:rPr lang="en-US"/>
+              <a:t>that we’ve used </a:t>
+            </a:r>
+            <a:r>
+              <a:rPr lang="en-US" dirty="0"/>
+              <a:t>for computation process.</a:t>
             </a:r>
           </a:p>
           <a:p>
@@ -5149,6 +5160,1230 @@
     <p:extLst>
       <p:ext uri="{BB962C8B-B14F-4D97-AF65-F5344CB8AC3E}">
         <p14:creationId xmlns:p14="http://schemas.microsoft.com/office/powerpoint/2010/main" val="836810173"/>
+      </p:ext>
+    </p:extLst>
+  </p:cSld>
+  <p:clrMapOvr>
+    <a:masterClrMapping/>
+  </p:clrMapOvr>
+</p:sld>
+</file>
+
+<file path=ppt/slides/slide11.xml><?xml version="1.0" encoding="utf-8"?>
+<p:sld xmlns:a="http://schemas.openxmlformats.org/drawingml/2006/main" xmlns:r="http://schemas.openxmlformats.org/officeDocument/2006/relationships" xmlns:p="http://schemas.openxmlformats.org/presentationml/2006/main">
+  <p:cSld>
+    <p:spTree>
+      <p:nvGrpSpPr>
+        <p:cNvPr id="1" name=""/>
+        <p:cNvGrpSpPr/>
+        <p:nvPr/>
+      </p:nvGrpSpPr>
+      <p:grpSpPr>
+        <a:xfrm>
+          <a:off x="0" y="0"/>
+          <a:ext cx="0" cy="0"/>
+          <a:chOff x="0" y="0"/>
+          <a:chExt cx="0" cy="0"/>
+        </a:xfrm>
+      </p:grpSpPr>
+      <p:sp>
+        <p:nvSpPr>
+          <p:cNvPr id="2" name="Title 1">
+            <a:extLst>
+              <a:ext uri="{FF2B5EF4-FFF2-40B4-BE49-F238E27FC236}">
+                <a16:creationId xmlns:a16="http://schemas.microsoft.com/office/drawing/2014/main" id="{5C5B9B99-D144-6C63-B70D-BC4BE417B54C}"/>
+              </a:ext>
+            </a:extLst>
+          </p:cNvPr>
+          <p:cNvSpPr>
+            <a:spLocks noGrp="1"/>
+          </p:cNvSpPr>
+          <p:nvPr>
+            <p:ph type="title"/>
+          </p:nvPr>
+        </p:nvSpPr>
+        <p:spPr/>
+        <p:txBody>
+          <a:bodyPr/>
+          <a:lstStyle/>
+          <a:p>
+            <a:r>
+              <a:rPr lang="en-US" dirty="0"/>
+              <a:t>Iam Service</a:t>
+            </a:r>
+          </a:p>
+        </p:txBody>
+      </p:sp>
+      <p:sp>
+        <p:nvSpPr>
+          <p:cNvPr id="3" name="Content Placeholder 2">
+            <a:extLst>
+              <a:ext uri="{FF2B5EF4-FFF2-40B4-BE49-F238E27FC236}">
+                <a16:creationId xmlns:a16="http://schemas.microsoft.com/office/drawing/2014/main" id="{189876AB-D5D0-2A4F-F557-068B8C724108}"/>
+              </a:ext>
+            </a:extLst>
+          </p:cNvPr>
+          <p:cNvSpPr>
+            <a:spLocks noGrp="1"/>
+          </p:cNvSpPr>
+          <p:nvPr>
+            <p:ph idx="1"/>
+          </p:nvPr>
+        </p:nvSpPr>
+        <p:spPr/>
+        <p:txBody>
+          <a:bodyPr>
+            <a:normAutofit/>
+          </a:bodyPr>
+          <a:lstStyle/>
+          <a:p>
+            <a:pPr algn="just">
+              <a:lnSpc>
+                <a:spcPct val="200000"/>
+              </a:lnSpc>
+            </a:pPr>
+            <a:r>
+              <a:rPr lang="en-US" sz="1800" dirty="0"/>
+              <a:t>Identity &amp; Access Management (IAM) is a global service</a:t>
+            </a:r>
+          </a:p>
+          <a:p>
+            <a:pPr algn="just">
+              <a:lnSpc>
+                <a:spcPct val="200000"/>
+              </a:lnSpc>
+            </a:pPr>
+            <a:r>
+              <a:rPr lang="en-US" sz="1800" dirty="0"/>
+              <a:t>In IAM, we create users and assigns them to groups.</a:t>
+            </a:r>
+          </a:p>
+          <a:p>
+            <a:pPr algn="just">
+              <a:lnSpc>
+                <a:spcPct val="200000"/>
+              </a:lnSpc>
+            </a:pPr>
+            <a:r>
+              <a:rPr lang="en-US" sz="1800" dirty="0"/>
+              <a:t>Root user is created by default when account is created.</a:t>
+            </a:r>
+          </a:p>
+          <a:p>
+            <a:pPr algn="just">
+              <a:lnSpc>
+                <a:spcPct val="200000"/>
+              </a:lnSpc>
+            </a:pPr>
+            <a:r>
+              <a:rPr lang="en-US" sz="1800" dirty="0"/>
+              <a:t>It is recommended to use root account only for account settings and nothing else nor share.</a:t>
+            </a:r>
+          </a:p>
+          <a:p>
+            <a:pPr algn="just">
+              <a:lnSpc>
+                <a:spcPct val="200000"/>
+              </a:lnSpc>
+            </a:pPr>
+            <a:r>
+              <a:rPr lang="en-US" sz="1800" dirty="0"/>
+              <a:t>Instead of root, use/create new users and assign them to groups.</a:t>
+            </a:r>
+          </a:p>
+          <a:p>
+            <a:pPr algn="just">
+              <a:lnSpc>
+                <a:spcPct val="200000"/>
+              </a:lnSpc>
+            </a:pPr>
+            <a:endParaRPr lang="en-US" sz="1800" dirty="0"/>
+          </a:p>
+          <a:p>
+            <a:pPr algn="just">
+              <a:lnSpc>
+                <a:spcPct val="200000"/>
+              </a:lnSpc>
+            </a:pPr>
+            <a:endParaRPr lang="en-US" sz="1800" dirty="0"/>
+          </a:p>
+        </p:txBody>
+      </p:sp>
+      <p:sp>
+        <p:nvSpPr>
+          <p:cNvPr id="4" name="Footer Placeholder 3">
+            <a:extLst>
+              <a:ext uri="{FF2B5EF4-FFF2-40B4-BE49-F238E27FC236}">
+                <a16:creationId xmlns:a16="http://schemas.microsoft.com/office/drawing/2014/main" id="{0B4C8B5F-7FC8-795F-9146-AA8B030434B9}"/>
+              </a:ext>
+            </a:extLst>
+          </p:cNvPr>
+          <p:cNvSpPr>
+            <a:spLocks noGrp="1"/>
+          </p:cNvSpPr>
+          <p:nvPr>
+            <p:ph type="ftr" sz="quarter" idx="11"/>
+          </p:nvPr>
+        </p:nvSpPr>
+        <p:spPr/>
+        <p:txBody>
+          <a:bodyPr/>
+          <a:lstStyle/>
+          <a:p>
+            <a:r>
+              <a:rPr lang="en-US"/>
+              <a:t>S. M. Abrar Shahriar</a:t>
+            </a:r>
+          </a:p>
+        </p:txBody>
+      </p:sp>
+      <p:sp>
+        <p:nvSpPr>
+          <p:cNvPr id="5" name="Slide Number Placeholder 4">
+            <a:extLst>
+              <a:ext uri="{FF2B5EF4-FFF2-40B4-BE49-F238E27FC236}">
+                <a16:creationId xmlns:a16="http://schemas.microsoft.com/office/drawing/2014/main" id="{E4D2FF78-ACDF-57E6-7F1B-A71BFD217F17}"/>
+              </a:ext>
+            </a:extLst>
+          </p:cNvPr>
+          <p:cNvSpPr>
+            <a:spLocks noGrp="1"/>
+          </p:cNvSpPr>
+          <p:nvPr>
+            <p:ph type="sldNum" sz="quarter" idx="12"/>
+          </p:nvPr>
+        </p:nvSpPr>
+        <p:spPr/>
+        <p:txBody>
+          <a:bodyPr/>
+          <a:lstStyle/>
+          <a:p>
+            <a:fld id="{74F1BC65-A0BD-46C1-8E18-CDBEDB4305F9}" type="slidenum">
+              <a:rPr lang="en-US" smtClean="0"/>
+              <a:t>11</a:t>
+            </a:fld>
+            <a:endParaRPr lang="en-US"/>
+          </a:p>
+        </p:txBody>
+      </p:sp>
+    </p:spTree>
+    <p:extLst>
+      <p:ext uri="{BB962C8B-B14F-4D97-AF65-F5344CB8AC3E}">
+        <p14:creationId xmlns:p14="http://schemas.microsoft.com/office/powerpoint/2010/main" val="1961953647"/>
+      </p:ext>
+    </p:extLst>
+  </p:cSld>
+  <p:clrMapOvr>
+    <a:masterClrMapping/>
+  </p:clrMapOvr>
+</p:sld>
+</file>
+
+<file path=ppt/slides/slide12.xml><?xml version="1.0" encoding="utf-8"?>
+<p:sld xmlns:a="http://schemas.openxmlformats.org/drawingml/2006/main" xmlns:r="http://schemas.openxmlformats.org/officeDocument/2006/relationships" xmlns:p="http://schemas.openxmlformats.org/presentationml/2006/main">
+  <p:cSld>
+    <p:spTree>
+      <p:nvGrpSpPr>
+        <p:cNvPr id="1" name=""/>
+        <p:cNvGrpSpPr/>
+        <p:nvPr/>
+      </p:nvGrpSpPr>
+      <p:grpSpPr>
+        <a:xfrm>
+          <a:off x="0" y="0"/>
+          <a:ext cx="0" cy="0"/>
+          <a:chOff x="0" y="0"/>
+          <a:chExt cx="0" cy="0"/>
+        </a:xfrm>
+      </p:grpSpPr>
+      <p:sp>
+        <p:nvSpPr>
+          <p:cNvPr id="2" name="Title 1">
+            <a:extLst>
+              <a:ext uri="{FF2B5EF4-FFF2-40B4-BE49-F238E27FC236}">
+                <a16:creationId xmlns:a16="http://schemas.microsoft.com/office/drawing/2014/main" id="{A8D10A29-A558-B528-86E6-7F6354043DD3}"/>
+              </a:ext>
+            </a:extLst>
+          </p:cNvPr>
+          <p:cNvSpPr>
+            <a:spLocks noGrp="1"/>
+          </p:cNvSpPr>
+          <p:nvPr>
+            <p:ph type="title"/>
+          </p:nvPr>
+        </p:nvSpPr>
+        <p:spPr/>
+        <p:txBody>
+          <a:bodyPr/>
+          <a:lstStyle/>
+          <a:p>
+            <a:r>
+              <a:rPr lang="en-US" dirty="0"/>
+              <a:t>IAM groups &amp; users - 1</a:t>
+            </a:r>
+          </a:p>
+        </p:txBody>
+      </p:sp>
+      <p:sp>
+        <p:nvSpPr>
+          <p:cNvPr id="4" name="Footer Placeholder 3">
+            <a:extLst>
+              <a:ext uri="{FF2B5EF4-FFF2-40B4-BE49-F238E27FC236}">
+                <a16:creationId xmlns:a16="http://schemas.microsoft.com/office/drawing/2014/main" id="{EBEF282A-5D1C-6B01-90AA-818606E58EB2}"/>
+              </a:ext>
+            </a:extLst>
+          </p:cNvPr>
+          <p:cNvSpPr>
+            <a:spLocks noGrp="1"/>
+          </p:cNvSpPr>
+          <p:nvPr>
+            <p:ph type="ftr" sz="quarter" idx="11"/>
+          </p:nvPr>
+        </p:nvSpPr>
+        <p:spPr/>
+        <p:txBody>
+          <a:bodyPr/>
+          <a:lstStyle/>
+          <a:p>
+            <a:r>
+              <a:rPr lang="en-US"/>
+              <a:t>S. M. Abrar Shahriar</a:t>
+            </a:r>
+          </a:p>
+        </p:txBody>
+      </p:sp>
+      <p:sp>
+        <p:nvSpPr>
+          <p:cNvPr id="5" name="Slide Number Placeholder 4">
+            <a:extLst>
+              <a:ext uri="{FF2B5EF4-FFF2-40B4-BE49-F238E27FC236}">
+                <a16:creationId xmlns:a16="http://schemas.microsoft.com/office/drawing/2014/main" id="{0C1BA169-89DF-9455-467D-6C60A8FD303B}"/>
+              </a:ext>
+            </a:extLst>
+          </p:cNvPr>
+          <p:cNvSpPr>
+            <a:spLocks noGrp="1"/>
+          </p:cNvSpPr>
+          <p:nvPr>
+            <p:ph type="sldNum" sz="quarter" idx="12"/>
+          </p:nvPr>
+        </p:nvSpPr>
+        <p:spPr/>
+        <p:txBody>
+          <a:bodyPr/>
+          <a:lstStyle/>
+          <a:p>
+            <a:fld id="{74F1BC65-A0BD-46C1-8E18-CDBEDB4305F9}" type="slidenum">
+              <a:rPr lang="en-US" smtClean="0"/>
+              <a:t>12</a:t>
+            </a:fld>
+            <a:endParaRPr lang="en-US"/>
+          </a:p>
+        </p:txBody>
+      </p:sp>
+      <p:sp>
+        <p:nvSpPr>
+          <p:cNvPr id="6" name="Rectangle 5">
+            <a:extLst>
+              <a:ext uri="{FF2B5EF4-FFF2-40B4-BE49-F238E27FC236}">
+                <a16:creationId xmlns:a16="http://schemas.microsoft.com/office/drawing/2014/main" id="{2A3D02B7-0807-537F-AFD6-1E812957CF6C}"/>
+              </a:ext>
+            </a:extLst>
+          </p:cNvPr>
+          <p:cNvSpPr/>
+          <p:nvPr/>
+        </p:nvSpPr>
+        <p:spPr>
+          <a:xfrm>
+            <a:off x="1111698" y="1965253"/>
+            <a:ext cx="8682931" cy="4320892"/>
+          </a:xfrm>
+          <a:prstGeom prst="rect">
+            <a:avLst/>
+          </a:prstGeom>
+          <a:noFill/>
+          <a:ln w="38100"/>
+        </p:spPr>
+        <p:style>
+          <a:lnRef idx="2">
+            <a:schemeClr val="dk1"/>
+          </a:lnRef>
+          <a:fillRef idx="1">
+            <a:schemeClr val="lt1"/>
+          </a:fillRef>
+          <a:effectRef idx="0">
+            <a:schemeClr val="dk1"/>
+          </a:effectRef>
+          <a:fontRef idx="minor">
+            <a:schemeClr val="dk1"/>
+          </a:fontRef>
+        </p:style>
+        <p:txBody>
+          <a:bodyPr rtlCol="0" anchor="ctr"/>
+          <a:lstStyle/>
+          <a:p>
+            <a:pPr algn="ctr"/>
+            <a:endParaRPr lang="en-US" dirty="0"/>
+          </a:p>
+        </p:txBody>
+      </p:sp>
+      <p:sp>
+        <p:nvSpPr>
+          <p:cNvPr id="7" name="Oval 6">
+            <a:extLst>
+              <a:ext uri="{FF2B5EF4-FFF2-40B4-BE49-F238E27FC236}">
+                <a16:creationId xmlns:a16="http://schemas.microsoft.com/office/drawing/2014/main" id="{062E5C86-7B7F-436B-0C70-086884EECE05}"/>
+              </a:ext>
+            </a:extLst>
+          </p:cNvPr>
+          <p:cNvSpPr/>
+          <p:nvPr/>
+        </p:nvSpPr>
+        <p:spPr>
+          <a:xfrm>
+            <a:off x="2119744" y="4667312"/>
+            <a:ext cx="1099038" cy="580293"/>
+          </a:xfrm>
+          <a:prstGeom prst="ellipse">
+            <a:avLst/>
+          </a:prstGeom>
+        </p:spPr>
+        <p:style>
+          <a:lnRef idx="2">
+            <a:schemeClr val="dk1"/>
+          </a:lnRef>
+          <a:fillRef idx="1">
+            <a:schemeClr val="lt1"/>
+          </a:fillRef>
+          <a:effectRef idx="0">
+            <a:schemeClr val="dk1"/>
+          </a:effectRef>
+          <a:fontRef idx="minor">
+            <a:schemeClr val="dk1"/>
+          </a:fontRef>
+        </p:style>
+        <p:txBody>
+          <a:bodyPr rtlCol="0" anchor="ctr"/>
+          <a:lstStyle/>
+          <a:p>
+            <a:pPr algn="ctr"/>
+            <a:r>
+              <a:rPr lang="en-US" dirty="0"/>
+              <a:t>Dev 3</a:t>
+            </a:r>
+          </a:p>
+        </p:txBody>
+      </p:sp>
+      <p:sp>
+        <p:nvSpPr>
+          <p:cNvPr id="8" name="Oval 7">
+            <a:extLst>
+              <a:ext uri="{FF2B5EF4-FFF2-40B4-BE49-F238E27FC236}">
+                <a16:creationId xmlns:a16="http://schemas.microsoft.com/office/drawing/2014/main" id="{487A9261-3D20-FE15-B745-5D6BCDDA1445}"/>
+              </a:ext>
+            </a:extLst>
+          </p:cNvPr>
+          <p:cNvSpPr/>
+          <p:nvPr/>
+        </p:nvSpPr>
+        <p:spPr>
+          <a:xfrm>
+            <a:off x="1566851" y="3835553"/>
+            <a:ext cx="1099038" cy="580293"/>
+          </a:xfrm>
+          <a:prstGeom prst="ellipse">
+            <a:avLst/>
+          </a:prstGeom>
+        </p:spPr>
+        <p:style>
+          <a:lnRef idx="2">
+            <a:schemeClr val="dk1"/>
+          </a:lnRef>
+          <a:fillRef idx="1">
+            <a:schemeClr val="lt1"/>
+          </a:fillRef>
+          <a:effectRef idx="0">
+            <a:schemeClr val="dk1"/>
+          </a:effectRef>
+          <a:fontRef idx="minor">
+            <a:schemeClr val="dk1"/>
+          </a:fontRef>
+        </p:style>
+        <p:txBody>
+          <a:bodyPr rtlCol="0" anchor="ctr"/>
+          <a:lstStyle/>
+          <a:p>
+            <a:pPr algn="ctr"/>
+            <a:r>
+              <a:rPr lang="en-US" dirty="0"/>
+              <a:t>Dev 1</a:t>
+            </a:r>
+          </a:p>
+        </p:txBody>
+      </p:sp>
+      <p:sp>
+        <p:nvSpPr>
+          <p:cNvPr id="9" name="Oval 8">
+            <a:extLst>
+              <a:ext uri="{FF2B5EF4-FFF2-40B4-BE49-F238E27FC236}">
+                <a16:creationId xmlns:a16="http://schemas.microsoft.com/office/drawing/2014/main" id="{BA9F6E94-8865-67F8-721C-DB13F36B3976}"/>
+              </a:ext>
+            </a:extLst>
+          </p:cNvPr>
+          <p:cNvSpPr/>
+          <p:nvPr/>
+        </p:nvSpPr>
+        <p:spPr>
+          <a:xfrm>
+            <a:off x="2769286" y="3827293"/>
+            <a:ext cx="1099038" cy="580293"/>
+          </a:xfrm>
+          <a:prstGeom prst="ellipse">
+            <a:avLst/>
+          </a:prstGeom>
+        </p:spPr>
+        <p:style>
+          <a:lnRef idx="2">
+            <a:schemeClr val="dk1"/>
+          </a:lnRef>
+          <a:fillRef idx="1">
+            <a:schemeClr val="lt1"/>
+          </a:fillRef>
+          <a:effectRef idx="0">
+            <a:schemeClr val="dk1"/>
+          </a:effectRef>
+          <a:fontRef idx="minor">
+            <a:schemeClr val="dk1"/>
+          </a:fontRef>
+        </p:style>
+        <p:txBody>
+          <a:bodyPr rtlCol="0" anchor="ctr"/>
+          <a:lstStyle/>
+          <a:p>
+            <a:pPr algn="ctr"/>
+            <a:r>
+              <a:rPr lang="en-US" dirty="0"/>
+              <a:t>Dev 2</a:t>
+            </a:r>
+          </a:p>
+        </p:txBody>
+      </p:sp>
+      <p:sp>
+        <p:nvSpPr>
+          <p:cNvPr id="10" name="Oval 9">
+            <a:extLst>
+              <a:ext uri="{FF2B5EF4-FFF2-40B4-BE49-F238E27FC236}">
+                <a16:creationId xmlns:a16="http://schemas.microsoft.com/office/drawing/2014/main" id="{826E335C-C6CC-6E9D-7822-A4E9F55F9C61}"/>
+              </a:ext>
+            </a:extLst>
+          </p:cNvPr>
+          <p:cNvSpPr/>
+          <p:nvPr/>
+        </p:nvSpPr>
+        <p:spPr>
+          <a:xfrm>
+            <a:off x="5925358" y="4574683"/>
+            <a:ext cx="1099038" cy="580293"/>
+          </a:xfrm>
+          <a:prstGeom prst="ellipse">
+            <a:avLst/>
+          </a:prstGeom>
+        </p:spPr>
+        <p:style>
+          <a:lnRef idx="2">
+            <a:schemeClr val="dk1"/>
+          </a:lnRef>
+          <a:fillRef idx="1">
+            <a:schemeClr val="lt1"/>
+          </a:fillRef>
+          <a:effectRef idx="0">
+            <a:schemeClr val="dk1"/>
+          </a:effectRef>
+          <a:fontRef idx="minor">
+            <a:schemeClr val="dk1"/>
+          </a:fontRef>
+        </p:style>
+        <p:txBody>
+          <a:bodyPr rtlCol="0" anchor="ctr"/>
+          <a:lstStyle/>
+          <a:p>
+            <a:pPr algn="ctr"/>
+            <a:r>
+              <a:rPr lang="en-US" dirty="0"/>
+              <a:t>Ops 3</a:t>
+            </a:r>
+          </a:p>
+        </p:txBody>
+      </p:sp>
+      <p:sp>
+        <p:nvSpPr>
+          <p:cNvPr id="11" name="Oval 10">
+            <a:extLst>
+              <a:ext uri="{FF2B5EF4-FFF2-40B4-BE49-F238E27FC236}">
+                <a16:creationId xmlns:a16="http://schemas.microsoft.com/office/drawing/2014/main" id="{F2932F0D-E3D4-A38D-EADB-FD188ECFE22C}"/>
+              </a:ext>
+            </a:extLst>
+          </p:cNvPr>
+          <p:cNvSpPr/>
+          <p:nvPr/>
+        </p:nvSpPr>
+        <p:spPr>
+          <a:xfrm>
+            <a:off x="5194460" y="3799782"/>
+            <a:ext cx="1099038" cy="580293"/>
+          </a:xfrm>
+          <a:prstGeom prst="ellipse">
+            <a:avLst/>
+          </a:prstGeom>
+        </p:spPr>
+        <p:style>
+          <a:lnRef idx="2">
+            <a:schemeClr val="dk1"/>
+          </a:lnRef>
+          <a:fillRef idx="1">
+            <a:schemeClr val="lt1"/>
+          </a:fillRef>
+          <a:effectRef idx="0">
+            <a:schemeClr val="dk1"/>
+          </a:effectRef>
+          <a:fontRef idx="minor">
+            <a:schemeClr val="dk1"/>
+          </a:fontRef>
+        </p:style>
+        <p:txBody>
+          <a:bodyPr rtlCol="0" anchor="ctr"/>
+          <a:lstStyle/>
+          <a:p>
+            <a:pPr algn="ctr"/>
+            <a:r>
+              <a:rPr lang="en-US" dirty="0"/>
+              <a:t>Ops 1</a:t>
+            </a:r>
+          </a:p>
+        </p:txBody>
+      </p:sp>
+      <p:sp>
+        <p:nvSpPr>
+          <p:cNvPr id="12" name="Oval 11">
+            <a:extLst>
+              <a:ext uri="{FF2B5EF4-FFF2-40B4-BE49-F238E27FC236}">
+                <a16:creationId xmlns:a16="http://schemas.microsoft.com/office/drawing/2014/main" id="{9F268DC0-200E-4031-9339-B6EB16BDAED1}"/>
+              </a:ext>
+            </a:extLst>
+          </p:cNvPr>
+          <p:cNvSpPr/>
+          <p:nvPr/>
+        </p:nvSpPr>
+        <p:spPr>
+          <a:xfrm>
+            <a:off x="6474877" y="3799781"/>
+            <a:ext cx="1099038" cy="580293"/>
+          </a:xfrm>
+          <a:prstGeom prst="ellipse">
+            <a:avLst/>
+          </a:prstGeom>
+        </p:spPr>
+        <p:style>
+          <a:lnRef idx="2">
+            <a:schemeClr val="dk1"/>
+          </a:lnRef>
+          <a:fillRef idx="1">
+            <a:schemeClr val="lt1"/>
+          </a:fillRef>
+          <a:effectRef idx="0">
+            <a:schemeClr val="dk1"/>
+          </a:effectRef>
+          <a:fontRef idx="minor">
+            <a:schemeClr val="dk1"/>
+          </a:fontRef>
+        </p:style>
+        <p:txBody>
+          <a:bodyPr rtlCol="0" anchor="ctr"/>
+          <a:lstStyle/>
+          <a:p>
+            <a:pPr algn="ctr"/>
+            <a:r>
+              <a:rPr lang="en-US" dirty="0"/>
+              <a:t>Ops 2</a:t>
+            </a:r>
+          </a:p>
+        </p:txBody>
+      </p:sp>
+      <p:sp>
+        <p:nvSpPr>
+          <p:cNvPr id="13" name="Rectangle 12">
+            <a:extLst>
+              <a:ext uri="{FF2B5EF4-FFF2-40B4-BE49-F238E27FC236}">
+                <a16:creationId xmlns:a16="http://schemas.microsoft.com/office/drawing/2014/main" id="{59481085-042E-BBB5-918E-AB58A5B4990B}"/>
+              </a:ext>
+            </a:extLst>
+          </p:cNvPr>
+          <p:cNvSpPr/>
+          <p:nvPr/>
+        </p:nvSpPr>
+        <p:spPr>
+          <a:xfrm>
+            <a:off x="1333617" y="3575827"/>
+            <a:ext cx="2911287" cy="1934308"/>
+          </a:xfrm>
+          <a:prstGeom prst="rect">
+            <a:avLst/>
+          </a:prstGeom>
+          <a:noFill/>
+          <a:ln w="38100"/>
+        </p:spPr>
+        <p:style>
+          <a:lnRef idx="2">
+            <a:schemeClr val="dk1"/>
+          </a:lnRef>
+          <a:fillRef idx="1">
+            <a:schemeClr val="lt1"/>
+          </a:fillRef>
+          <a:effectRef idx="0">
+            <a:schemeClr val="dk1"/>
+          </a:effectRef>
+          <a:fontRef idx="minor">
+            <a:schemeClr val="dk1"/>
+          </a:fontRef>
+        </p:style>
+        <p:txBody>
+          <a:bodyPr rtlCol="0" anchor="ctr"/>
+          <a:lstStyle/>
+          <a:p>
+            <a:pPr algn="ctr"/>
+            <a:endParaRPr lang="en-US" dirty="0"/>
+          </a:p>
+        </p:txBody>
+      </p:sp>
+      <p:sp>
+        <p:nvSpPr>
+          <p:cNvPr id="14" name="Rectangle 13">
+            <a:extLst>
+              <a:ext uri="{FF2B5EF4-FFF2-40B4-BE49-F238E27FC236}">
+                <a16:creationId xmlns:a16="http://schemas.microsoft.com/office/drawing/2014/main" id="{A6FF11C9-33BC-5F84-0176-3A6A1ADF3908}"/>
+              </a:ext>
+            </a:extLst>
+          </p:cNvPr>
+          <p:cNvSpPr/>
+          <p:nvPr/>
+        </p:nvSpPr>
+        <p:spPr>
+          <a:xfrm>
+            <a:off x="4900253" y="3596041"/>
+            <a:ext cx="2779492" cy="1934308"/>
+          </a:xfrm>
+          <a:prstGeom prst="rect">
+            <a:avLst/>
+          </a:prstGeom>
+          <a:noFill/>
+          <a:ln w="38100"/>
+        </p:spPr>
+        <p:style>
+          <a:lnRef idx="2">
+            <a:schemeClr val="dk1"/>
+          </a:lnRef>
+          <a:fillRef idx="1">
+            <a:schemeClr val="lt1"/>
+          </a:fillRef>
+          <a:effectRef idx="0">
+            <a:schemeClr val="dk1"/>
+          </a:effectRef>
+          <a:fontRef idx="minor">
+            <a:schemeClr val="dk1"/>
+          </a:fontRef>
+        </p:style>
+        <p:txBody>
+          <a:bodyPr rtlCol="0" anchor="ctr"/>
+          <a:lstStyle/>
+          <a:p>
+            <a:pPr algn="ctr"/>
+            <a:endParaRPr lang="en-US" dirty="0"/>
+          </a:p>
+        </p:txBody>
+      </p:sp>
+      <p:sp>
+        <p:nvSpPr>
+          <p:cNvPr id="15" name="TextBox 14">
+            <a:extLst>
+              <a:ext uri="{FF2B5EF4-FFF2-40B4-BE49-F238E27FC236}">
+                <a16:creationId xmlns:a16="http://schemas.microsoft.com/office/drawing/2014/main" id="{4874B508-FE22-DDB5-7357-7A3AB807CFE7}"/>
+              </a:ext>
+            </a:extLst>
+          </p:cNvPr>
+          <p:cNvSpPr txBox="1"/>
+          <p:nvPr/>
+        </p:nvSpPr>
+        <p:spPr>
+          <a:xfrm>
+            <a:off x="1603382" y="5585195"/>
+            <a:ext cx="2395271" cy="369332"/>
+          </a:xfrm>
+          <a:prstGeom prst="rect">
+            <a:avLst/>
+          </a:prstGeom>
+          <a:noFill/>
+        </p:spPr>
+        <p:txBody>
+          <a:bodyPr wrap="none" rtlCol="0">
+            <a:spAutoFit/>
+          </a:bodyPr>
+          <a:lstStyle/>
+          <a:p>
+            <a:r>
+              <a:rPr lang="en-US" dirty="0"/>
+              <a:t>Group: Development</a:t>
+            </a:r>
+          </a:p>
+        </p:txBody>
+      </p:sp>
+      <p:sp>
+        <p:nvSpPr>
+          <p:cNvPr id="16" name="TextBox 15">
+            <a:extLst>
+              <a:ext uri="{FF2B5EF4-FFF2-40B4-BE49-F238E27FC236}">
+                <a16:creationId xmlns:a16="http://schemas.microsoft.com/office/drawing/2014/main" id="{B26B1A93-EC2D-0A74-9E27-A86878D27C12}"/>
+              </a:ext>
+            </a:extLst>
+          </p:cNvPr>
+          <p:cNvSpPr txBox="1"/>
+          <p:nvPr/>
+        </p:nvSpPr>
+        <p:spPr>
+          <a:xfrm>
+            <a:off x="5155555" y="5622556"/>
+            <a:ext cx="2045945" cy="369332"/>
+          </a:xfrm>
+          <a:prstGeom prst="rect">
+            <a:avLst/>
+          </a:prstGeom>
+          <a:noFill/>
+        </p:spPr>
+        <p:txBody>
+          <a:bodyPr wrap="none" rtlCol="0">
+            <a:spAutoFit/>
+          </a:bodyPr>
+          <a:lstStyle/>
+          <a:p>
+            <a:r>
+              <a:rPr lang="en-US" dirty="0"/>
+              <a:t>Group: Operation</a:t>
+            </a:r>
+          </a:p>
+        </p:txBody>
+      </p:sp>
+      <p:sp>
+        <p:nvSpPr>
+          <p:cNvPr id="17" name="Oval 16">
+            <a:extLst>
+              <a:ext uri="{FF2B5EF4-FFF2-40B4-BE49-F238E27FC236}">
+                <a16:creationId xmlns:a16="http://schemas.microsoft.com/office/drawing/2014/main" id="{8A8B39D8-7A2A-DB13-5E7F-9644FCA4F668}"/>
+              </a:ext>
+            </a:extLst>
+          </p:cNvPr>
+          <p:cNvSpPr/>
+          <p:nvPr/>
+        </p:nvSpPr>
+        <p:spPr>
+          <a:xfrm>
+            <a:off x="8164812" y="4043860"/>
+            <a:ext cx="1099038" cy="580293"/>
+          </a:xfrm>
+          <a:prstGeom prst="ellipse">
+            <a:avLst/>
+          </a:prstGeom>
+        </p:spPr>
+        <p:style>
+          <a:lnRef idx="2">
+            <a:schemeClr val="dk1"/>
+          </a:lnRef>
+          <a:fillRef idx="1">
+            <a:schemeClr val="lt1"/>
+          </a:fillRef>
+          <a:effectRef idx="0">
+            <a:schemeClr val="dk1"/>
+          </a:effectRef>
+          <a:fontRef idx="minor">
+            <a:schemeClr val="dk1"/>
+          </a:fontRef>
+        </p:style>
+        <p:txBody>
+          <a:bodyPr rtlCol="0" anchor="ctr"/>
+          <a:lstStyle/>
+          <a:p>
+            <a:pPr algn="ctr"/>
+            <a:r>
+              <a:rPr lang="en-US" dirty="0"/>
+              <a:t>User 1</a:t>
+            </a:r>
+          </a:p>
+        </p:txBody>
+      </p:sp>
+      <p:sp>
+        <p:nvSpPr>
+          <p:cNvPr id="18" name="TextBox 17">
+            <a:extLst>
+              <a:ext uri="{FF2B5EF4-FFF2-40B4-BE49-F238E27FC236}">
+                <a16:creationId xmlns:a16="http://schemas.microsoft.com/office/drawing/2014/main" id="{B6B3F5D7-8BA8-84A4-E466-0B5F717A1AD6}"/>
+              </a:ext>
+            </a:extLst>
+          </p:cNvPr>
+          <p:cNvSpPr txBox="1"/>
+          <p:nvPr/>
+        </p:nvSpPr>
+        <p:spPr>
+          <a:xfrm>
+            <a:off x="7715910" y="4668714"/>
+            <a:ext cx="1804853" cy="369332"/>
+          </a:xfrm>
+          <a:prstGeom prst="rect">
+            <a:avLst/>
+          </a:prstGeom>
+          <a:noFill/>
+        </p:spPr>
+        <p:txBody>
+          <a:bodyPr wrap="none" rtlCol="0">
+            <a:spAutoFit/>
+          </a:bodyPr>
+          <a:lstStyle/>
+          <a:p>
+            <a:r>
+              <a:rPr lang="en-US" dirty="0"/>
+              <a:t>Group: (NONE)</a:t>
+            </a:r>
+          </a:p>
+        </p:txBody>
+      </p:sp>
+      <p:sp>
+        <p:nvSpPr>
+          <p:cNvPr id="19" name="TextBox 18">
+            <a:extLst>
+              <a:ext uri="{FF2B5EF4-FFF2-40B4-BE49-F238E27FC236}">
+                <a16:creationId xmlns:a16="http://schemas.microsoft.com/office/drawing/2014/main" id="{853075D1-8FBA-07AE-980D-722050F52964}"/>
+              </a:ext>
+            </a:extLst>
+          </p:cNvPr>
+          <p:cNvSpPr txBox="1"/>
+          <p:nvPr/>
+        </p:nvSpPr>
+        <p:spPr>
+          <a:xfrm>
+            <a:off x="1300371" y="2138166"/>
+            <a:ext cx="7963479" cy="1288879"/>
+          </a:xfrm>
+          <a:prstGeom prst="rect">
+            <a:avLst/>
+          </a:prstGeom>
+          <a:noFill/>
+        </p:spPr>
+        <p:txBody>
+          <a:bodyPr wrap="square" rtlCol="0">
+            <a:spAutoFit/>
+          </a:bodyPr>
+          <a:lstStyle/>
+          <a:p>
+            <a:pPr marL="285750" indent="-285750" algn="just">
+              <a:lnSpc>
+                <a:spcPct val="150000"/>
+              </a:lnSpc>
+              <a:buFont typeface="Wingdings" panose="05000000000000000000" pitchFamily="2" charset="2"/>
+              <a:buChar char="§"/>
+            </a:pPr>
+            <a:r>
+              <a:rPr lang="en-US" dirty="0"/>
+              <a:t>Groups contains users only</a:t>
+            </a:r>
+          </a:p>
+          <a:p>
+            <a:pPr marL="285750" indent="-285750" algn="just">
+              <a:lnSpc>
+                <a:spcPct val="150000"/>
+              </a:lnSpc>
+              <a:buFont typeface="Wingdings" panose="05000000000000000000" pitchFamily="2" charset="2"/>
+              <a:buChar char="§"/>
+            </a:pPr>
+            <a:r>
+              <a:rPr lang="en-US" dirty="0"/>
+              <a:t>Group cannot contain another group</a:t>
+            </a:r>
+          </a:p>
+          <a:p>
+            <a:pPr marL="285750" indent="-285750" algn="just">
+              <a:lnSpc>
+                <a:spcPct val="150000"/>
+              </a:lnSpc>
+              <a:buFont typeface="Wingdings" panose="05000000000000000000" pitchFamily="2" charset="2"/>
+              <a:buChar char="§"/>
+            </a:pPr>
+            <a:r>
+              <a:rPr lang="en-US" dirty="0"/>
+              <a:t>A user can exist without a group, also can be a part of multiple group</a:t>
+            </a:r>
+          </a:p>
+        </p:txBody>
+      </p:sp>
+      <p:sp>
+        <p:nvSpPr>
+          <p:cNvPr id="20" name="Oval 19">
+            <a:extLst>
+              <a:ext uri="{FF2B5EF4-FFF2-40B4-BE49-F238E27FC236}">
+                <a16:creationId xmlns:a16="http://schemas.microsoft.com/office/drawing/2014/main" id="{7E6A382B-AE89-09C2-AB1B-606C23324990}"/>
+              </a:ext>
+            </a:extLst>
+          </p:cNvPr>
+          <p:cNvSpPr/>
+          <p:nvPr/>
+        </p:nvSpPr>
+        <p:spPr>
+          <a:xfrm>
+            <a:off x="3710134" y="4552362"/>
+            <a:ext cx="1659080" cy="769246"/>
+          </a:xfrm>
+          <a:prstGeom prst="ellipse">
+            <a:avLst/>
+          </a:prstGeom>
+        </p:spPr>
+        <p:style>
+          <a:lnRef idx="2">
+            <a:schemeClr val="dk1"/>
+          </a:lnRef>
+          <a:fillRef idx="1">
+            <a:schemeClr val="lt1"/>
+          </a:fillRef>
+          <a:effectRef idx="0">
+            <a:schemeClr val="dk1"/>
+          </a:effectRef>
+          <a:fontRef idx="minor">
+            <a:schemeClr val="dk1"/>
+          </a:fontRef>
+        </p:style>
+        <p:txBody>
+          <a:bodyPr rtlCol="0" anchor="ctr"/>
+          <a:lstStyle/>
+          <a:p>
+            <a:pPr algn="ctr"/>
+            <a:r>
+              <a:rPr lang="en-US" dirty="0"/>
+              <a:t>DevOps</a:t>
+            </a:r>
+          </a:p>
+          <a:p>
+            <a:pPr algn="ctr"/>
+            <a:r>
+              <a:rPr lang="en-US" dirty="0"/>
+              <a:t>User 1</a:t>
+            </a:r>
+          </a:p>
+        </p:txBody>
+      </p:sp>
+    </p:spTree>
+    <p:extLst>
+      <p:ext uri="{BB962C8B-B14F-4D97-AF65-F5344CB8AC3E}">
+        <p14:creationId xmlns:p14="http://schemas.microsoft.com/office/powerpoint/2010/main" val="2746597805"/>
+      </p:ext>
+    </p:extLst>
+  </p:cSld>
+  <p:clrMapOvr>
+    <a:masterClrMapping/>
+  </p:clrMapOvr>
+</p:sld>
+</file>
+
+<file path=ppt/slides/slide13.xml><?xml version="1.0" encoding="utf-8"?>
+<p:sld xmlns:a="http://schemas.openxmlformats.org/drawingml/2006/main" xmlns:r="http://schemas.openxmlformats.org/officeDocument/2006/relationships" xmlns:p="http://schemas.openxmlformats.org/presentationml/2006/main">
+  <p:cSld>
+    <p:spTree>
+      <p:nvGrpSpPr>
+        <p:cNvPr id="1" name=""/>
+        <p:cNvGrpSpPr/>
+        <p:nvPr/>
+      </p:nvGrpSpPr>
+      <p:grpSpPr>
+        <a:xfrm>
+          <a:off x="0" y="0"/>
+          <a:ext cx="0" cy="0"/>
+          <a:chOff x="0" y="0"/>
+          <a:chExt cx="0" cy="0"/>
+        </a:xfrm>
+      </p:grpSpPr>
+      <p:sp>
+        <p:nvSpPr>
+          <p:cNvPr id="2" name="Title 1">
+            <a:extLst>
+              <a:ext uri="{FF2B5EF4-FFF2-40B4-BE49-F238E27FC236}">
+                <a16:creationId xmlns:a16="http://schemas.microsoft.com/office/drawing/2014/main" id="{6E0E8AE5-86C1-5596-22D2-AC5D283A6F7B}"/>
+              </a:ext>
+            </a:extLst>
+          </p:cNvPr>
+          <p:cNvSpPr>
+            <a:spLocks noGrp="1"/>
+          </p:cNvSpPr>
+          <p:nvPr>
+            <p:ph type="title"/>
+          </p:nvPr>
+        </p:nvSpPr>
+        <p:spPr/>
+        <p:txBody>
+          <a:bodyPr/>
+          <a:lstStyle/>
+          <a:p>
+            <a:r>
+              <a:rPr lang="en-US" dirty="0"/>
+              <a:t>IAM groups &amp; users - 2</a:t>
+            </a:r>
+          </a:p>
+        </p:txBody>
+      </p:sp>
+      <p:sp>
+        <p:nvSpPr>
+          <p:cNvPr id="3" name="Content Placeholder 2">
+            <a:extLst>
+              <a:ext uri="{FF2B5EF4-FFF2-40B4-BE49-F238E27FC236}">
+                <a16:creationId xmlns:a16="http://schemas.microsoft.com/office/drawing/2014/main" id="{D9CF6C24-FEB7-9967-DEE5-88BB30120A10}"/>
+              </a:ext>
+            </a:extLst>
+          </p:cNvPr>
+          <p:cNvSpPr>
+            <a:spLocks noGrp="1"/>
+          </p:cNvSpPr>
+          <p:nvPr>
+            <p:ph idx="1"/>
+          </p:nvPr>
+        </p:nvSpPr>
+        <p:spPr/>
+        <p:txBody>
+          <a:bodyPr/>
+          <a:lstStyle/>
+          <a:p>
+            <a:pPr algn="just">
+              <a:lnSpc>
+                <a:spcPct val="200000"/>
+              </a:lnSpc>
+            </a:pPr>
+            <a:r>
+              <a:rPr lang="en-US" dirty="0"/>
+              <a:t>We create users and groups so that users can access AWS account.</a:t>
+            </a:r>
+          </a:p>
+          <a:p>
+            <a:pPr algn="just">
+              <a:lnSpc>
+                <a:spcPct val="200000"/>
+              </a:lnSpc>
+            </a:pPr>
+            <a:r>
+              <a:rPr lang="en-US" dirty="0"/>
+              <a:t>Users and groups needs to be given permissions in order to access AWS</a:t>
+            </a:r>
+          </a:p>
+          <a:p>
+            <a:pPr algn="just">
+              <a:lnSpc>
+                <a:spcPct val="200000"/>
+              </a:lnSpc>
+            </a:pPr>
+            <a:r>
+              <a:rPr lang="en-US" dirty="0"/>
+              <a:t>IAM policy is a </a:t>
+            </a:r>
+            <a:r>
+              <a:rPr lang="en-US" dirty="0" err="1"/>
+              <a:t>json</a:t>
+            </a:r>
+            <a:r>
+              <a:rPr lang="en-US" dirty="0"/>
+              <a:t> document where we assign users and groups.</a:t>
+            </a:r>
+          </a:p>
+          <a:p>
+            <a:pPr algn="just">
+              <a:lnSpc>
+                <a:spcPct val="200000"/>
+              </a:lnSpc>
+            </a:pPr>
+            <a:r>
+              <a:rPr lang="en-US" dirty="0"/>
+              <a:t>Through IAM policy we allow users to use different AWS services.</a:t>
+            </a:r>
+          </a:p>
+          <a:p>
+            <a:pPr algn="just">
+              <a:lnSpc>
+                <a:spcPct val="200000"/>
+              </a:lnSpc>
+            </a:pPr>
+            <a:r>
+              <a:rPr lang="en-US" dirty="0"/>
+              <a:t>Least Privilege Principle indicates do give more </a:t>
+            </a:r>
+            <a:r>
+              <a:rPr lang="en-US"/>
+              <a:t>permissions than a user needs.</a:t>
+            </a:r>
+            <a:endParaRPr lang="en-US" dirty="0"/>
+          </a:p>
+        </p:txBody>
+      </p:sp>
+      <p:sp>
+        <p:nvSpPr>
+          <p:cNvPr id="4" name="Footer Placeholder 3">
+            <a:extLst>
+              <a:ext uri="{FF2B5EF4-FFF2-40B4-BE49-F238E27FC236}">
+                <a16:creationId xmlns:a16="http://schemas.microsoft.com/office/drawing/2014/main" id="{4B30C7B0-68EC-C309-3DA3-94F3DEFFA862}"/>
+              </a:ext>
+            </a:extLst>
+          </p:cNvPr>
+          <p:cNvSpPr>
+            <a:spLocks noGrp="1"/>
+          </p:cNvSpPr>
+          <p:nvPr>
+            <p:ph type="ftr" sz="quarter" idx="11"/>
+          </p:nvPr>
+        </p:nvSpPr>
+        <p:spPr/>
+        <p:txBody>
+          <a:bodyPr/>
+          <a:lstStyle/>
+          <a:p>
+            <a:r>
+              <a:rPr lang="en-US"/>
+              <a:t>S. M. Abrar Shahriar</a:t>
+            </a:r>
+          </a:p>
+        </p:txBody>
+      </p:sp>
+      <p:sp>
+        <p:nvSpPr>
+          <p:cNvPr id="5" name="Slide Number Placeholder 4">
+            <a:extLst>
+              <a:ext uri="{FF2B5EF4-FFF2-40B4-BE49-F238E27FC236}">
+                <a16:creationId xmlns:a16="http://schemas.microsoft.com/office/drawing/2014/main" id="{1A6A2692-223B-1A60-E1AC-753A5C046C57}"/>
+              </a:ext>
+            </a:extLst>
+          </p:cNvPr>
+          <p:cNvSpPr>
+            <a:spLocks noGrp="1"/>
+          </p:cNvSpPr>
+          <p:nvPr>
+            <p:ph type="sldNum" sz="quarter" idx="12"/>
+          </p:nvPr>
+        </p:nvSpPr>
+        <p:spPr/>
+        <p:txBody>
+          <a:bodyPr/>
+          <a:lstStyle/>
+          <a:p>
+            <a:fld id="{74F1BC65-A0BD-46C1-8E18-CDBEDB4305F9}" type="slidenum">
+              <a:rPr lang="en-US" smtClean="0"/>
+              <a:t>13</a:t>
+            </a:fld>
+            <a:endParaRPr lang="en-US"/>
+          </a:p>
+        </p:txBody>
+      </p:sp>
+    </p:spTree>
+    <p:extLst>
+      <p:ext uri="{BB962C8B-B14F-4D97-AF65-F5344CB8AC3E}">
+        <p14:creationId xmlns:p14="http://schemas.microsoft.com/office/powerpoint/2010/main" val="2464208549"/>
       </p:ext>
     </p:extLst>
   </p:cSld>
@@ -6262,8 +7497,8 @@
         </p:nvSpPr>
         <p:spPr>
           <a:xfrm>
-            <a:off x="1187960" y="1816698"/>
-            <a:ext cx="10405941" cy="4360408"/>
+            <a:off x="1230923" y="1816698"/>
+            <a:ext cx="10080206" cy="4360408"/>
           </a:xfrm>
           <a:prstGeom prst="rect">
             <a:avLst/>
@@ -6294,8 +7529,9 @@
                 <a:solidFill>
                   <a:srgbClr val="FF0000"/>
                 </a:solidFill>
+                <a:latin typeface="Bahnschrift" panose="020B0502040204020203" pitchFamily="34" charset="0"/>
               </a:rPr>
-              <a:t>BUILDING/ DATACETER</a:t>
+              <a:t>BUILDING/DATACENTER</a:t>
             </a:r>
           </a:p>
         </p:txBody>
@@ -6847,7 +8083,7 @@
         </p:nvSpPr>
         <p:spPr>
           <a:xfrm>
-            <a:off x="8213353" y="2018571"/>
+            <a:off x="7974431" y="2018571"/>
             <a:ext cx="3147721" cy="3956661"/>
           </a:xfrm>
           <a:prstGeom prst="rect">
@@ -7310,8 +8546,8 @@
         </p:blipFill>
         <p:spPr bwMode="auto">
           <a:xfrm>
-            <a:off x="1672981" y="2093976"/>
-            <a:ext cx="8096250" cy="3543300"/>
+            <a:off x="1250950" y="2093976"/>
+            <a:ext cx="8816242" cy="3858402"/>
           </a:xfrm>
           <a:prstGeom prst="rect">
             <a:avLst/>

</xml_diff>